<commit_message>
[MINDX] MODULE 2 - BUOI 11
</commit_message>
<xml_diff>
--- a/01_MODULE_2/BUOI_6/HR_Attrition_template.pptx
+++ b/01_MODULE_2/BUOI_6/HR_Attrition_template.pptx
@@ -6,8 +6,9 @@
   </p:sldMasterIdLst>
   <p:sldIdLst>
     <p:sldId id="256" r:id="rId3"/>
-    <p:sldId id="258" r:id="rId4"/>
-    <p:sldId id="257" r:id="rId5"/>
+    <p:sldId id="259" r:id="rId4"/>
+    <p:sldId id="258" r:id="rId5"/>
+    <p:sldId id="257" r:id="rId6"/>
   </p:sldIdLst>
   <p:sldSz cx="12192000" cy="6858000"/>
   <p:notesSz cx="6858000" cy="9144000"/>
@@ -3546,6 +3547,523 @@
         </p:nvSpPr>
         <p:spPr>
           <a:xfrm>
+            <a:off x="248920" y="292608"/>
+            <a:ext cx="11521440" cy="6272784"/>
+          </a:xfrm>
+          <a:prstGeom prst="roundRect">
+            <a:avLst>
+              <a:gd name="adj" fmla="val 3867"/>
+            </a:avLst>
+          </a:prstGeom>
+          <a:solidFill>
+            <a:srgbClr val="484B5C"/>
+          </a:solidFill>
+          <a:ln>
+            <a:noFill/>
+          </a:ln>
+        </p:spPr>
+        <p:style>
+          <a:lnRef idx="2">
+            <a:schemeClr val="accent1">
+              <a:lumMod val="75000"/>
+            </a:schemeClr>
+          </a:lnRef>
+          <a:fillRef idx="1">
+            <a:schemeClr val="accent1"/>
+          </a:fillRef>
+          <a:effectRef idx="0">
+            <a:srgbClr val="FFFFFF"/>
+          </a:effectRef>
+          <a:fontRef idx="minor">
+            <a:schemeClr val="lt1"/>
+          </a:fontRef>
+        </p:style>
+        <p:txBody>
+          <a:bodyPr rtlCol="0" anchor="ctr"/>
+          <a:p>
+            <a:pPr algn="ctr"/>
+            <a:endParaRPr lang="en-US"/>
+          </a:p>
+        </p:txBody>
+      </p:sp>
+      <p:sp>
+        <p:nvSpPr>
+          <p:cNvPr id="6" name="Rounded Rectangle 5"/>
+          <p:cNvSpPr/>
+          <p:nvPr/>
+        </p:nvSpPr>
+        <p:spPr>
+          <a:xfrm>
+            <a:off x="4692650" y="567055"/>
+            <a:ext cx="6995160" cy="2862072"/>
+          </a:xfrm>
+          <a:prstGeom prst="roundRect">
+            <a:avLst>
+              <a:gd name="adj" fmla="val 9784"/>
+            </a:avLst>
+          </a:prstGeom>
+          <a:solidFill>
+            <a:srgbClr val="2E2F3C"/>
+          </a:solidFill>
+          <a:ln>
+            <a:noFill/>
+          </a:ln>
+        </p:spPr>
+        <p:style>
+          <a:lnRef idx="2">
+            <a:schemeClr val="accent1">
+              <a:lumMod val="75000"/>
+            </a:schemeClr>
+          </a:lnRef>
+          <a:fillRef idx="1">
+            <a:schemeClr val="accent1"/>
+          </a:fillRef>
+          <a:effectRef idx="0">
+            <a:srgbClr val="FFFFFF"/>
+          </a:effectRef>
+          <a:fontRef idx="minor">
+            <a:schemeClr val="lt1"/>
+          </a:fontRef>
+        </p:style>
+        <p:txBody>
+          <a:bodyPr rtlCol="0" anchor="ctr"/>
+          <a:p>
+            <a:pPr algn="ctr"/>
+            <a:endParaRPr lang="en-US"/>
+          </a:p>
+        </p:txBody>
+      </p:sp>
+      <p:sp>
+        <p:nvSpPr>
+          <p:cNvPr id="20" name="Oval 19"/>
+          <p:cNvSpPr/>
+          <p:nvPr/>
+        </p:nvSpPr>
+        <p:spPr>
+          <a:xfrm>
+            <a:off x="451485" y="567055"/>
+            <a:ext cx="591185" cy="552450"/>
+          </a:xfrm>
+          <a:prstGeom prst="ellipse">
+            <a:avLst/>
+          </a:prstGeom>
+          <a:solidFill>
+            <a:schemeClr val="bg1"/>
+          </a:solidFill>
+          <a:ln>
+            <a:noFill/>
+          </a:ln>
+        </p:spPr>
+        <p:style>
+          <a:lnRef idx="2">
+            <a:schemeClr val="accent1">
+              <a:lumMod val="75000"/>
+            </a:schemeClr>
+          </a:lnRef>
+          <a:fillRef idx="1">
+            <a:schemeClr val="accent1"/>
+          </a:fillRef>
+          <a:effectRef idx="0">
+            <a:srgbClr val="FFFFFF"/>
+          </a:effectRef>
+          <a:fontRef idx="minor">
+            <a:schemeClr val="lt1"/>
+          </a:fontRef>
+        </p:style>
+        <p:txBody>
+          <a:bodyPr rtlCol="0" anchor="ctr"/>
+          <a:p>
+            <a:pPr algn="ctr"/>
+            <a:endParaRPr lang="en-US">
+              <a:solidFill>
+                <a:schemeClr val="tx1"/>
+              </a:solidFill>
+            </a:endParaRPr>
+          </a:p>
+        </p:txBody>
+      </p:sp>
+      <p:pic>
+        <p:nvPicPr>
+          <p:cNvPr id="21" name="Picture 20" descr="pngtree-human-icon-organization-human-work-vector-png-image_21153594"/>
+          <p:cNvPicPr>
+            <a:picLocks noChangeAspect="1"/>
+          </p:cNvPicPr>
+          <p:nvPr/>
+        </p:nvPicPr>
+        <p:blipFill>
+          <a:blip r:embed="rId1"/>
+          <a:stretch>
+            <a:fillRect/>
+          </a:stretch>
+        </p:blipFill>
+        <p:spPr>
+          <a:xfrm>
+            <a:off x="387985" y="455295"/>
+            <a:ext cx="718185" cy="718185"/>
+          </a:xfrm>
+          <a:prstGeom prst="rect">
+            <a:avLst/>
+          </a:prstGeom>
+        </p:spPr>
+      </p:pic>
+      <p:sp>
+        <p:nvSpPr>
+          <p:cNvPr id="22" name="Text Box 21"/>
+          <p:cNvSpPr txBox="1"/>
+          <p:nvPr/>
+        </p:nvSpPr>
+        <p:spPr>
+          <a:xfrm>
+            <a:off x="972820" y="346710"/>
+            <a:ext cx="2145030" cy="583565"/>
+          </a:xfrm>
+          <a:prstGeom prst="rect">
+            <a:avLst/>
+          </a:prstGeom>
+          <a:noFill/>
+        </p:spPr>
+        <p:txBody>
+          <a:bodyPr wrap="square" rtlCol="0">
+            <a:spAutoFit/>
+          </a:bodyPr>
+          <a:p>
+            <a:pPr algn="ctr"/>
+            <a:r>
+              <a:rPr lang="en-US" sz="3200">
+                <a:gradFill>
+                  <a:gsLst>
+                    <a:gs pos="0">
+                      <a:schemeClr val="accent1">
+                        <a:lumMod val="45000"/>
+                        <a:lumOff val="55000"/>
+                      </a:schemeClr>
+                    </a:gs>
+                    <a:gs pos="100000">
+                      <a:schemeClr val="accent1">
+                        <a:lumMod val="30000"/>
+                        <a:lumOff val="70000"/>
+                      </a:schemeClr>
+                    </a:gs>
+                  </a:gsLst>
+                  <a:lin ang="13500000" scaled="0"/>
+                </a:gradFill>
+                <a:effectLst/>
+              </a:rPr>
+              <a:t>Hr</a:t>
+            </a:r>
+            <a:r>
+              <a:rPr lang="en-US" sz="3200">
+                <a:gradFill>
+                  <a:gsLst>
+                    <a:gs pos="0">
+                      <a:schemeClr val="accent1">
+                        <a:lumMod val="45000"/>
+                        <a:lumOff val="55000"/>
+                      </a:schemeClr>
+                    </a:gs>
+                    <a:gs pos="100000">
+                      <a:schemeClr val="accent1">
+                        <a:lumMod val="30000"/>
+                        <a:lumOff val="70000"/>
+                      </a:schemeClr>
+                    </a:gs>
+                  </a:gsLst>
+                  <a:lin ang="13500000" scaled="0"/>
+                </a:gradFill>
+                <a:effectLst>
+                  <a:outerShdw blurRad="38100" dist="38100" dir="2700000" algn="tl">
+                    <a:srgbClr val="000000">
+                      <a:alpha val="43137"/>
+                    </a:srgbClr>
+                  </a:outerShdw>
+                </a:effectLst>
+              </a:rPr>
+              <a:t> </a:t>
+            </a:r>
+            <a:r>
+              <a:rPr lang="en-US" sz="3200">
+                <a:gradFill>
+                  <a:gsLst>
+                    <a:gs pos="0">
+                      <a:schemeClr val="accent1">
+                        <a:lumMod val="45000"/>
+                        <a:lumOff val="55000"/>
+                      </a:schemeClr>
+                    </a:gs>
+                    <a:gs pos="100000">
+                      <a:schemeClr val="accent1">
+                        <a:lumMod val="30000"/>
+                        <a:lumOff val="70000"/>
+                      </a:schemeClr>
+                    </a:gs>
+                  </a:gsLst>
+                  <a:lin ang="13500000" scaled="0"/>
+                </a:gradFill>
+                <a:effectLst/>
+              </a:rPr>
+              <a:t>Attrtion</a:t>
+            </a:r>
+            <a:endParaRPr lang="en-US" sz="3200">
+              <a:gradFill>
+                <a:gsLst>
+                  <a:gs pos="0">
+                    <a:schemeClr val="accent1">
+                      <a:lumMod val="45000"/>
+                      <a:lumOff val="55000"/>
+                    </a:schemeClr>
+                  </a:gs>
+                  <a:gs pos="100000">
+                    <a:schemeClr val="accent1">
+                      <a:lumMod val="30000"/>
+                      <a:lumOff val="70000"/>
+                    </a:schemeClr>
+                  </a:gs>
+                </a:gsLst>
+                <a:lin ang="13500000" scaled="0"/>
+              </a:gradFill>
+              <a:effectLst/>
+            </a:endParaRPr>
+          </a:p>
+        </p:txBody>
+      </p:sp>
+      <p:sp>
+        <p:nvSpPr>
+          <p:cNvPr id="23" name="Text Box 22"/>
+          <p:cNvSpPr txBox="1"/>
+          <p:nvPr/>
+        </p:nvSpPr>
+        <p:spPr>
+          <a:xfrm>
+            <a:off x="1042670" y="705485"/>
+            <a:ext cx="2667000" cy="583565"/>
+          </a:xfrm>
+          <a:prstGeom prst="rect">
+            <a:avLst/>
+          </a:prstGeom>
+          <a:noFill/>
+        </p:spPr>
+        <p:txBody>
+          <a:bodyPr wrap="square" rtlCol="0">
+            <a:spAutoFit/>
+          </a:bodyPr>
+          <a:p>
+            <a:r>
+              <a:rPr lang="en-US" sz="3200">
+                <a:gradFill>
+                  <a:gsLst>
+                    <a:gs pos="0">
+                      <a:schemeClr val="accent1">
+                        <a:lumMod val="45000"/>
+                        <a:lumOff val="55000"/>
+                      </a:schemeClr>
+                    </a:gs>
+                    <a:gs pos="100000">
+                      <a:schemeClr val="accent1">
+                        <a:lumMod val="30000"/>
+                        <a:lumOff val="70000"/>
+                      </a:schemeClr>
+                    </a:gs>
+                  </a:gsLst>
+                  <a:lin ang="13500000" scaled="0"/>
+                </a:gradFill>
+                <a:latin typeface="Arial Black" panose="020B0A04020102020204" charset="0"/>
+                <a:cs typeface="Arial Black" panose="020B0A04020102020204" charset="0"/>
+              </a:rPr>
+              <a:t>Dashboard</a:t>
+            </a:r>
+            <a:endParaRPr lang="en-US" sz="3200">
+              <a:gradFill>
+                <a:gsLst>
+                  <a:gs pos="0">
+                    <a:schemeClr val="accent1">
+                      <a:lumMod val="45000"/>
+                      <a:lumOff val="55000"/>
+                    </a:schemeClr>
+                  </a:gs>
+                  <a:gs pos="100000">
+                    <a:schemeClr val="accent1">
+                      <a:lumMod val="30000"/>
+                      <a:lumOff val="70000"/>
+                    </a:schemeClr>
+                  </a:gs>
+                </a:gsLst>
+                <a:lin ang="13500000" scaled="0"/>
+              </a:gradFill>
+              <a:latin typeface="Arial Black" panose="020B0A04020102020204" charset="0"/>
+              <a:cs typeface="Arial Black" panose="020B0A04020102020204" charset="0"/>
+            </a:endParaRPr>
+          </a:p>
+        </p:txBody>
+      </p:sp>
+      <p:cxnSp>
+        <p:nvCxnSpPr>
+          <p:cNvPr id="24" name="Straight Connector 23"/>
+          <p:cNvCxnSpPr/>
+          <p:nvPr/>
+        </p:nvCxnSpPr>
+        <p:spPr>
+          <a:xfrm>
+            <a:off x="419735" y="1323975"/>
+            <a:ext cx="3138805" cy="12700"/>
+          </a:xfrm>
+          <a:prstGeom prst="line">
+            <a:avLst/>
+          </a:prstGeom>
+          <a:ln w="19050">
+            <a:solidFill>
+              <a:schemeClr val="tx1">
+                <a:lumMod val="85000"/>
+                <a:lumOff val="15000"/>
+              </a:schemeClr>
+            </a:solidFill>
+          </a:ln>
+        </p:spPr>
+        <p:style>
+          <a:lnRef idx="2">
+            <a:schemeClr val="accent1"/>
+          </a:lnRef>
+          <a:fillRef idx="0">
+            <a:srgbClr val="FFFFFF"/>
+          </a:fillRef>
+          <a:effectRef idx="0">
+            <a:srgbClr val="FFFFFF"/>
+          </a:effectRef>
+          <a:fontRef idx="minor">
+            <a:schemeClr val="tx1"/>
+          </a:fontRef>
+        </p:style>
+      </p:cxnSp>
+      <p:sp>
+        <p:nvSpPr>
+          <p:cNvPr id="2" name="Rounded Rectangle 1"/>
+          <p:cNvSpPr/>
+          <p:nvPr/>
+        </p:nvSpPr>
+        <p:spPr>
+          <a:xfrm>
+            <a:off x="4692650" y="3556000"/>
+            <a:ext cx="6995160" cy="2862072"/>
+          </a:xfrm>
+          <a:prstGeom prst="roundRect">
+            <a:avLst>
+              <a:gd name="adj" fmla="val 9784"/>
+            </a:avLst>
+          </a:prstGeom>
+          <a:solidFill>
+            <a:srgbClr val="2E2F3C"/>
+          </a:solidFill>
+          <a:ln>
+            <a:noFill/>
+          </a:ln>
+        </p:spPr>
+        <p:style>
+          <a:lnRef idx="2">
+            <a:schemeClr val="accent1">
+              <a:lumMod val="75000"/>
+            </a:schemeClr>
+          </a:lnRef>
+          <a:fillRef idx="1">
+            <a:schemeClr val="accent1"/>
+          </a:fillRef>
+          <a:effectRef idx="0">
+            <a:srgbClr val="FFFFFF"/>
+          </a:effectRef>
+          <a:fontRef idx="minor">
+            <a:schemeClr val="lt1"/>
+          </a:fontRef>
+        </p:style>
+        <p:txBody>
+          <a:bodyPr rtlCol="0" anchor="ctr"/>
+          <a:p>
+            <a:pPr algn="ctr"/>
+            <a:endParaRPr lang="en-US"/>
+          </a:p>
+        </p:txBody>
+      </p:sp>
+    </p:spTree>
+  </p:cSld>
+  <p:clrMapOvr>
+    <a:masterClrMapping/>
+  </p:clrMapOvr>
+</p:sld>
+</file>
+
+<file path=ppt/slides/slide3.xml><?xml version="1.0" encoding="utf-8"?>
+<p:sld xmlns:a="http://schemas.openxmlformats.org/drawingml/2006/main" xmlns:r="http://schemas.openxmlformats.org/officeDocument/2006/relationships" xmlns:p="http://schemas.openxmlformats.org/presentationml/2006/main">
+  <p:cSld>
+    <p:bg>
+      <p:bgPr>
+        <a:solidFill>
+          <a:schemeClr val="tx1">
+            <a:lumMod val="95000"/>
+            <a:lumOff val="5000"/>
+          </a:schemeClr>
+        </a:solidFill>
+        <a:effectLst/>
+      </p:bgPr>
+    </p:bg>
+    <p:spTree>
+      <p:nvGrpSpPr>
+        <p:cNvPr id="1" name=""/>
+        <p:cNvGrpSpPr/>
+        <p:nvPr/>
+      </p:nvGrpSpPr>
+      <p:grpSpPr/>
+      <p:sp>
+        <p:nvSpPr>
+          <p:cNvPr id="19" name="Rounded Rectangle 18"/>
+          <p:cNvSpPr/>
+          <p:nvPr/>
+        </p:nvSpPr>
+        <p:spPr>
+          <a:xfrm>
+            <a:off x="335280" y="292608"/>
+            <a:ext cx="11521440" cy="6272784"/>
+          </a:xfrm>
+          <a:prstGeom prst="roundRect">
+            <a:avLst>
+              <a:gd name="adj" fmla="val 3867"/>
+            </a:avLst>
+          </a:prstGeom>
+          <a:solidFill>
+            <a:srgbClr val="EE2868"/>
+          </a:solidFill>
+          <a:ln>
+            <a:noFill/>
+          </a:ln>
+        </p:spPr>
+        <p:style>
+          <a:lnRef idx="2">
+            <a:schemeClr val="accent1">
+              <a:lumMod val="75000"/>
+            </a:schemeClr>
+          </a:lnRef>
+          <a:fillRef idx="1">
+            <a:schemeClr val="accent1"/>
+          </a:fillRef>
+          <a:effectRef idx="0">
+            <a:srgbClr val="FFFFFF"/>
+          </a:effectRef>
+          <a:fontRef idx="minor">
+            <a:schemeClr val="lt1"/>
+          </a:fontRef>
+        </p:style>
+        <p:txBody>
+          <a:bodyPr rtlCol="0" anchor="ctr"/>
+          <a:p>
+            <a:pPr algn="ctr"/>
+            <a:endParaRPr lang="en-US"/>
+          </a:p>
+        </p:txBody>
+      </p:sp>
+      <p:sp>
+        <p:nvSpPr>
+          <p:cNvPr id="4" name="Rounded Rectangle 3"/>
+          <p:cNvSpPr/>
+          <p:nvPr/>
+        </p:nvSpPr>
+        <p:spPr>
+          <a:xfrm>
             <a:off x="203835" y="292608"/>
             <a:ext cx="11521440" cy="6272784"/>
           </a:xfrm>
@@ -4049,7 +4567,7 @@
 </p:sld>
 </file>
 
-<file path=ppt/slides/slide3.xml><?xml version="1.0" encoding="utf-8"?>
+<file path=ppt/slides/slide4.xml><?xml version="1.0" encoding="utf-8"?>
 <p:sld xmlns:a="http://schemas.openxmlformats.org/drawingml/2006/main" xmlns:r="http://schemas.openxmlformats.org/officeDocument/2006/relationships" xmlns:p="http://schemas.openxmlformats.org/presentationml/2006/main">
   <p:cSld>
     <p:bg>

</xml_diff>